<commit_message>
fixed missing Rhma in RF, then re-ran
</commit_message>
<xml_diff>
--- a/7_figures/Figure_S5.pptx
+++ b/7_figures/Figure_S5.pptx
@@ -243,7 +243,7 @@
           <a:p>
             <a:fld id="{F6B9FB2B-A3A7-A94E-84E9-EF22A7183D67}" type="datetimeFigureOut">
               <a:rPr lang="en-US" smtClean="0"/>
-              <a:t>12/15/20</a:t>
+              <a:t>12/20/20</a:t>
             </a:fld>
             <a:endParaRPr lang="en-US"/>
           </a:p>
@@ -413,7 +413,7 @@
           <a:p>
             <a:fld id="{F6B9FB2B-A3A7-A94E-84E9-EF22A7183D67}" type="datetimeFigureOut">
               <a:rPr lang="en-US" smtClean="0"/>
-              <a:t>12/15/20</a:t>
+              <a:t>12/20/20</a:t>
             </a:fld>
             <a:endParaRPr lang="en-US"/>
           </a:p>
@@ -593,7 +593,7 @@
           <a:p>
             <a:fld id="{F6B9FB2B-A3A7-A94E-84E9-EF22A7183D67}" type="datetimeFigureOut">
               <a:rPr lang="en-US" smtClean="0"/>
-              <a:t>12/15/20</a:t>
+              <a:t>12/20/20</a:t>
             </a:fld>
             <a:endParaRPr lang="en-US"/>
           </a:p>
@@ -763,7 +763,7 @@
           <a:p>
             <a:fld id="{F6B9FB2B-A3A7-A94E-84E9-EF22A7183D67}" type="datetimeFigureOut">
               <a:rPr lang="en-US" smtClean="0"/>
-              <a:t>12/15/20</a:t>
+              <a:t>12/20/20</a:t>
             </a:fld>
             <a:endParaRPr lang="en-US"/>
           </a:p>
@@ -1007,7 +1007,7 @@
           <a:p>
             <a:fld id="{F6B9FB2B-A3A7-A94E-84E9-EF22A7183D67}" type="datetimeFigureOut">
               <a:rPr lang="en-US" smtClean="0"/>
-              <a:t>12/15/20</a:t>
+              <a:t>12/20/20</a:t>
             </a:fld>
             <a:endParaRPr lang="en-US"/>
           </a:p>
@@ -1239,7 +1239,7 @@
           <a:p>
             <a:fld id="{F6B9FB2B-A3A7-A94E-84E9-EF22A7183D67}" type="datetimeFigureOut">
               <a:rPr lang="en-US" smtClean="0"/>
-              <a:t>12/15/20</a:t>
+              <a:t>12/20/20</a:t>
             </a:fld>
             <a:endParaRPr lang="en-US"/>
           </a:p>
@@ -1606,7 +1606,7 @@
           <a:p>
             <a:fld id="{F6B9FB2B-A3A7-A94E-84E9-EF22A7183D67}" type="datetimeFigureOut">
               <a:rPr lang="en-US" smtClean="0"/>
-              <a:t>12/15/20</a:t>
+              <a:t>12/20/20</a:t>
             </a:fld>
             <a:endParaRPr lang="en-US"/>
           </a:p>
@@ -1724,7 +1724,7 @@
           <a:p>
             <a:fld id="{F6B9FB2B-A3A7-A94E-84E9-EF22A7183D67}" type="datetimeFigureOut">
               <a:rPr lang="en-US" smtClean="0"/>
-              <a:t>12/15/20</a:t>
+              <a:t>12/20/20</a:t>
             </a:fld>
             <a:endParaRPr lang="en-US"/>
           </a:p>
@@ -1819,7 +1819,7 @@
           <a:p>
             <a:fld id="{F6B9FB2B-A3A7-A94E-84E9-EF22A7183D67}" type="datetimeFigureOut">
               <a:rPr lang="en-US" smtClean="0"/>
-              <a:t>12/15/20</a:t>
+              <a:t>12/20/20</a:t>
             </a:fld>
             <a:endParaRPr lang="en-US"/>
           </a:p>
@@ -2096,7 +2096,7 @@
           <a:p>
             <a:fld id="{F6B9FB2B-A3A7-A94E-84E9-EF22A7183D67}" type="datetimeFigureOut">
               <a:rPr lang="en-US" smtClean="0"/>
-              <a:t>12/15/20</a:t>
+              <a:t>12/20/20</a:t>
             </a:fld>
             <a:endParaRPr lang="en-US"/>
           </a:p>
@@ -2353,7 +2353,7 @@
           <a:p>
             <a:fld id="{F6B9FB2B-A3A7-A94E-84E9-EF22A7183D67}" type="datetimeFigureOut">
               <a:rPr lang="en-US" smtClean="0"/>
-              <a:t>12/15/20</a:t>
+              <a:t>12/20/20</a:t>
             </a:fld>
             <a:endParaRPr lang="en-US"/>
           </a:p>
@@ -2566,7 +2566,7 @@
           <a:p>
             <a:fld id="{F6B9FB2B-A3A7-A94E-84E9-EF22A7183D67}" type="datetimeFigureOut">
               <a:rPr lang="en-US" smtClean="0"/>
-              <a:t>12/15/20</a:t>
+              <a:t>12/20/20</a:t>
             </a:fld>
             <a:endParaRPr lang="en-US"/>
           </a:p>

</xml_diff>